<commit_message>
Update Where in the World Are Your Trends Taking.pptx
</commit_message>
<xml_diff>
--- a/Where in the World Are Your Trends Taking.pptx
+++ b/Where in the World Are Your Trends Taking.pptx
@@ -108,6 +108,11 @@
       </a:defRPr>
     </a:lvl9pPr>
   </p:defaultTextStyle>
+  <p:extLst>
+    <p:ext uri="{EFAFB233-063F-42B5-8137-9DF3F51BA10A}">
+      <p15:sldGuideLst xmlns:p15="http://schemas.microsoft.com/office/powerpoint/2012/main"/>
+    </p:ext>
+  </p:extLst>
 </p:presentation>
 </file>
 
@@ -13650,17 +13655,10 @@
               <a:t>Presenters: </a:t>
             </a:r>
             <a:r>
-              <a:rPr lang="en-US" i="1" dirty="0"/>
-              <a:t>Shailesh </a:t>
+              <a:rPr lang="en-US" i="1"/>
+              <a:t>Shailesh Godkhindi</a:t>
             </a:r>
-            <a:r>
-              <a:rPr lang="en-US" i="1" dirty="0" err="1"/>
-              <a:t>Godkhindi</a:t>
-            </a:r>
-            <a:r>
-              <a:rPr lang="en-US" i="1" dirty="0"/>
-              <a:t> </a:t>
-            </a:r>
+            <a:endParaRPr lang="en-US" i="1" dirty="0"/>
           </a:p>
           <a:p>
             <a:r>

</xml_diff>